<commit_message>
Submete Diagrama de Gantt e Power Point
</commit_message>
<xml_diff>
--- a/2Fase/Apresentação-FaseII.pptx
+++ b/2Fase/Apresentação-FaseII.pptx
@@ -226,7 +226,7 @@
           <a:p>
             <a:fld id="{83E9F078-F226-4DFC-A659-BA9427B6E162}" type="datetimeFigureOut">
               <a:rPr lang="pt-PT" smtClean="0"/>
-              <a:t>18-05-2016</a:t>
+              <a:t>19-05-2016</a:t>
             </a:fld>
             <a:endParaRPr lang="pt-PT"/>
           </a:p>
@@ -4860,7 +4860,7 @@
           <a:p>
             <a:fld id="{36E5539B-DE7E-4F23-A1C9-CE30CE7F18F6}" type="datetime1">
               <a:rPr lang="pt-PT" smtClean="0"/>
-              <a:t>18-05-2016</a:t>
+              <a:t>19-05-2016</a:t>
             </a:fld>
             <a:endParaRPr lang="pt-PT"/>
           </a:p>
@@ -5127,7 +5127,7 @@
           <a:p>
             <a:fld id="{85E51108-BF11-42DE-B378-7FCF42EE5E39}" type="datetime1">
               <a:rPr lang="pt-PT" smtClean="0"/>
-              <a:t>18-05-2016</a:t>
+              <a:t>19-05-2016</a:t>
             </a:fld>
             <a:endParaRPr lang="pt-PT"/>
           </a:p>
@@ -5324,7 +5324,7 @@
           <a:p>
             <a:fld id="{85E51108-BF11-42DE-B378-7FCF42EE5E39}" type="datetime1">
               <a:rPr lang="pt-PT" smtClean="0"/>
-              <a:t>18-05-2016</a:t>
+              <a:t>19-05-2016</a:t>
             </a:fld>
             <a:endParaRPr lang="pt-PT"/>
           </a:p>
@@ -5588,7 +5588,7 @@
           <a:p>
             <a:fld id="{85E51108-BF11-42DE-B378-7FCF42EE5E39}" type="datetime1">
               <a:rPr lang="pt-PT" smtClean="0"/>
-              <a:t>18-05-2016</a:t>
+              <a:t>19-05-2016</a:t>
             </a:fld>
             <a:endParaRPr lang="pt-PT"/>
           </a:p>
@@ -6023,7 +6023,7 @@
           <a:p>
             <a:fld id="{85E51108-BF11-42DE-B378-7FCF42EE5E39}" type="datetime1">
               <a:rPr lang="pt-PT" smtClean="0"/>
-              <a:t>18-05-2016</a:t>
+              <a:t>19-05-2016</a:t>
             </a:fld>
             <a:endParaRPr lang="pt-PT"/>
           </a:p>
@@ -6570,7 +6570,7 @@
           <a:p>
             <a:fld id="{85E51108-BF11-42DE-B378-7FCF42EE5E39}" type="datetime1">
               <a:rPr lang="pt-PT" smtClean="0"/>
-              <a:t>18-05-2016</a:t>
+              <a:t>19-05-2016</a:t>
             </a:fld>
             <a:endParaRPr lang="pt-PT"/>
           </a:p>
@@ -7291,7 +7291,7 @@
           <a:p>
             <a:fld id="{85E51108-BF11-42DE-B378-7FCF42EE5E39}" type="datetime1">
               <a:rPr lang="pt-PT" smtClean="0"/>
-              <a:t>18-05-2016</a:t>
+              <a:t>19-05-2016</a:t>
             </a:fld>
             <a:endParaRPr lang="pt-PT"/>
           </a:p>
@@ -7462,7 +7462,7 @@
           <a:p>
             <a:fld id="{BE57CD12-191D-4D75-9205-A8D69FDF743A}" type="datetime1">
               <a:rPr lang="pt-PT" smtClean="0"/>
-              <a:t>18-05-2016</a:t>
+              <a:t>19-05-2016</a:t>
             </a:fld>
             <a:endParaRPr lang="pt-PT"/>
           </a:p>
@@ -7642,7 +7642,7 @@
           <a:p>
             <a:fld id="{0303C1ED-BE5C-48F0-B6F7-89E5EDDD897E}" type="datetime1">
               <a:rPr lang="pt-PT" smtClean="0"/>
-              <a:t>18-05-2016</a:t>
+              <a:t>19-05-2016</a:t>
             </a:fld>
             <a:endParaRPr lang="pt-PT"/>
           </a:p>
@@ -7812,7 +7812,7 @@
           <a:p>
             <a:fld id="{85E51108-BF11-42DE-B378-7FCF42EE5E39}" type="datetime1">
               <a:rPr lang="pt-PT" smtClean="0"/>
-              <a:t>18-05-2016</a:t>
+              <a:t>19-05-2016</a:t>
             </a:fld>
             <a:endParaRPr lang="pt-PT"/>
           </a:p>
@@ -8063,7 +8063,7 @@
           <a:p>
             <a:fld id="{2A56A083-9373-43F0-A7DD-7E8E292C951F}" type="datetime1">
               <a:rPr lang="pt-PT" smtClean="0"/>
-              <a:t>18-05-2016</a:t>
+              <a:t>19-05-2016</a:t>
             </a:fld>
             <a:endParaRPr lang="pt-PT"/>
           </a:p>
@@ -8295,7 +8295,7 @@
           <a:p>
             <a:fld id="{63ABDDD8-8137-435A-94E5-4477E80B80E0}" type="datetime1">
               <a:rPr lang="pt-PT" smtClean="0"/>
-              <a:t>18-05-2016</a:t>
+              <a:t>19-05-2016</a:t>
             </a:fld>
             <a:endParaRPr lang="pt-PT"/>
           </a:p>
@@ -8676,7 +8676,7 @@
           <a:p>
             <a:fld id="{161E4E16-6EF0-4835-8707-4FF2E2C7C008}" type="datetime1">
               <a:rPr lang="pt-PT" smtClean="0"/>
-              <a:t>18-05-2016</a:t>
+              <a:t>19-05-2016</a:t>
             </a:fld>
             <a:endParaRPr lang="pt-PT"/>
           </a:p>
@@ -8794,7 +8794,7 @@
           <a:p>
             <a:fld id="{7B13FCDE-835D-49DC-89FC-D92F3E4E6922}" type="datetime1">
               <a:rPr lang="pt-PT" smtClean="0"/>
-              <a:t>18-05-2016</a:t>
+              <a:t>19-05-2016</a:t>
             </a:fld>
             <a:endParaRPr lang="pt-PT"/>
           </a:p>
@@ -8889,7 +8889,7 @@
           <a:p>
             <a:fld id="{5AAA2E9A-E76B-414A-9090-B8A9FE493C79}" type="datetime1">
               <a:rPr lang="pt-PT" smtClean="0"/>
-              <a:t>18-05-2016</a:t>
+              <a:t>19-05-2016</a:t>
             </a:fld>
             <a:endParaRPr lang="pt-PT"/>
           </a:p>
@@ -9138,7 +9138,7 @@
           <a:p>
             <a:fld id="{F4220D7E-20B6-49E1-A054-BC1B40C90E3C}" type="datetime1">
               <a:rPr lang="pt-PT" smtClean="0"/>
-              <a:t>18-05-2016</a:t>
+              <a:t>19-05-2016</a:t>
             </a:fld>
             <a:endParaRPr lang="pt-PT"/>
           </a:p>
@@ -9418,7 +9418,7 @@
           <a:p>
             <a:fld id="{F847BF96-34F7-4BBA-9B67-8B74FC2B103B}" type="datetime1">
               <a:rPr lang="pt-PT" smtClean="0"/>
-              <a:t>18-05-2016</a:t>
+              <a:t>19-05-2016</a:t>
             </a:fld>
             <a:endParaRPr lang="pt-PT"/>
           </a:p>
@@ -12485,7 +12485,7 @@
           <a:p>
             <a:fld id="{85E51108-BF11-42DE-B378-7FCF42EE5E39}" type="datetime1">
               <a:rPr lang="pt-PT" smtClean="0"/>
-              <a:t>18-05-2016</a:t>
+              <a:t>19-05-2016</a:t>
             </a:fld>
             <a:endParaRPr lang="pt-PT"/>
           </a:p>
@@ -13821,16 +13821,6 @@
               </a:rPr>
               <a:t>Campo – Fase II</a:t>
             </a:r>
-            <a:endParaRPr lang="pt-PT" sz="1200" dirty="0" smtClean="0">
-              <a:solidFill>
-                <a:schemeClr val="accent6">
-                  <a:lumMod val="60000"/>
-                  <a:lumOff val="40000"/>
-                </a:schemeClr>
-              </a:solidFill>
-              <a:latin typeface="Calibri" panose="020F0502020204030204" pitchFamily="34" charset="0"/>
-              <a:cs typeface="Helvetica" panose="020B0604020202020204" pitchFamily="34" charset="0"/>
-            </a:endParaRPr>
           </a:p>
         </p:txBody>
       </p:sp>
@@ -14381,16 +14371,6 @@
               </a:rPr>
               <a:t>Campo – Fase II</a:t>
             </a:r>
-            <a:endParaRPr lang="pt-PT" sz="1200" dirty="0" smtClean="0">
-              <a:solidFill>
-                <a:schemeClr val="accent6">
-                  <a:lumMod val="60000"/>
-                  <a:lumOff val="40000"/>
-                </a:schemeClr>
-              </a:solidFill>
-              <a:latin typeface="Calibri" panose="020F0502020204030204" pitchFamily="34" charset="0"/>
-              <a:cs typeface="Helvetica" panose="020B0604020202020204" pitchFamily="34" charset="0"/>
-            </a:endParaRPr>
           </a:p>
         </p:txBody>
       </p:sp>
@@ -14507,13 +14487,13 @@
   <p:clrMapOvr>
     <a:masterClrMapping/>
   </p:clrMapOvr>
-  <mc:AlternateContent xmlns:mc="http://schemas.openxmlformats.org/markup-compatibility/2006">
-    <mc:Choice xmlns:p14="http://schemas.microsoft.com/office/powerpoint/2010/main" Requires="p14">
+  <mc:AlternateContent xmlns:mc="http://schemas.openxmlformats.org/markup-compatibility/2006" xmlns:p14="http://schemas.microsoft.com/office/powerpoint/2010/main">
+    <mc:Choice Requires="p14">
       <p:transition spd="slow" p14:dur="1600">
         <p14:gallery dir="l"/>
       </p:transition>
     </mc:Choice>
-    <mc:Fallback>
+    <mc:Fallback xmlns="">
       <p:transition spd="slow">
         <p:fade/>
       </p:transition>
@@ -14716,16 +14696,6 @@
               </a:rPr>
               <a:t>Campo – Fase II</a:t>
             </a:r>
-            <a:endParaRPr lang="pt-PT" sz="1200" dirty="0" smtClean="0">
-              <a:solidFill>
-                <a:schemeClr val="accent6">
-                  <a:lumMod val="60000"/>
-                  <a:lumOff val="40000"/>
-                </a:schemeClr>
-              </a:solidFill>
-              <a:latin typeface="Calibri" panose="020F0502020204030204" pitchFamily="34" charset="0"/>
-              <a:cs typeface="Helvetica" panose="020B0604020202020204" pitchFamily="34" charset="0"/>
-            </a:endParaRPr>
           </a:p>
         </p:txBody>
       </p:sp>
@@ -14912,7 +14882,6 @@
               <a:rPr lang="pt-PT" sz="1400" dirty="0"/>
               <a:t>Ecrã inicial</a:t>
             </a:r>
-            <a:endParaRPr lang="pt-PT" sz="1400" dirty="0"/>
           </a:p>
         </p:txBody>
       </p:sp>
@@ -14996,7 +14965,6 @@
               <a:rPr lang="pt-PT" sz="1400" dirty="0"/>
               <a:t>Ecrã de Administrador</a:t>
             </a:r>
-            <a:endParaRPr lang="pt-PT" sz="1400" dirty="0"/>
           </a:p>
         </p:txBody>
       </p:sp>
@@ -15227,16 +15195,6 @@
               </a:rPr>
               <a:t>Campo – Fase II</a:t>
             </a:r>
-            <a:endParaRPr lang="pt-PT" sz="1200" dirty="0" smtClean="0">
-              <a:solidFill>
-                <a:schemeClr val="accent6">
-                  <a:lumMod val="60000"/>
-                  <a:lumOff val="40000"/>
-                </a:schemeClr>
-              </a:solidFill>
-              <a:latin typeface="Calibri" panose="020F0502020204030204" pitchFamily="34" charset="0"/>
-              <a:cs typeface="Helvetica" panose="020B0604020202020204" pitchFamily="34" charset="0"/>
-            </a:endParaRPr>
           </a:p>
         </p:txBody>
       </p:sp>
@@ -15599,7 +15557,6 @@
               <a:rPr lang="pt-PT" sz="1400" dirty="0"/>
               <a:t>Ecrã da missão – Detalhes textuais</a:t>
             </a:r>
-            <a:endParaRPr lang="pt-PT" sz="1400" dirty="0"/>
           </a:p>
         </p:txBody>
       </p:sp>
@@ -15859,7 +15816,6 @@
               <a:rPr lang="pt-PT" sz="1300" dirty="0"/>
               <a:t>Ecrã do percurso/detalhes de um registo</a:t>
             </a:r>
-            <a:endParaRPr lang="pt-PT" sz="1300" dirty="0"/>
           </a:p>
         </p:txBody>
       </p:sp>
@@ -15873,13 +15829,13 @@
   <p:clrMapOvr>
     <a:masterClrMapping/>
   </p:clrMapOvr>
-  <mc:AlternateContent xmlns:mc="http://schemas.openxmlformats.org/markup-compatibility/2006">
-    <mc:Choice xmlns:p14="http://schemas.microsoft.com/office/powerpoint/2010/main" Requires="p14">
+  <mc:AlternateContent xmlns:mc="http://schemas.openxmlformats.org/markup-compatibility/2006" xmlns:p14="http://schemas.microsoft.com/office/powerpoint/2010/main">
+    <mc:Choice Requires="p14">
       <p:transition spd="slow" p14:dur="1600">
         <p14:gallery dir="l"/>
       </p:transition>
     </mc:Choice>
-    <mc:Fallback>
+    <mc:Fallback xmlns="">
       <p:transition spd="slow">
         <p:fade/>
       </p:transition>
@@ -15997,16 +15953,6 @@
               </a:rPr>
               <a:t>Campo – Fase II</a:t>
             </a:r>
-            <a:endParaRPr lang="pt-PT" sz="1200" dirty="0" smtClean="0">
-              <a:solidFill>
-                <a:schemeClr val="accent6">
-                  <a:lumMod val="60000"/>
-                  <a:lumOff val="40000"/>
-                </a:schemeClr>
-              </a:solidFill>
-              <a:latin typeface="Calibri" panose="020F0502020204030204" pitchFamily="34" charset="0"/>
-              <a:cs typeface="Helvetica" panose="020B0604020202020204" pitchFamily="34" charset="0"/>
-            </a:endParaRPr>
           </a:p>
         </p:txBody>
       </p:sp>
@@ -16193,7 +16139,6 @@
               <a:rPr lang="pt-PT" sz="1400" dirty="0"/>
               <a:t>Ecrã dos registos do caderno de notas</a:t>
             </a:r>
-            <a:endParaRPr lang="pt-PT" sz="1400" dirty="0"/>
           </a:p>
         </p:txBody>
       </p:sp>
@@ -16277,7 +16222,6 @@
               <a:rPr lang="pt-PT" sz="1400" dirty="0"/>
               <a:t>Ecrã dos registos fotográficos</a:t>
             </a:r>
-            <a:endParaRPr lang="pt-PT" sz="1400" dirty="0"/>
           </a:p>
         </p:txBody>
       </p:sp>
@@ -16365,7 +16309,6 @@
               <a:rPr lang="pt-PT" sz="1400" dirty="0"/>
               <a:t>dos registos textuais</a:t>
             </a:r>
-            <a:endParaRPr lang="pt-PT" sz="1400" dirty="0"/>
           </a:p>
         </p:txBody>
       </p:sp>
@@ -16471,13 +16414,13 @@
   <p:clrMapOvr>
     <a:masterClrMapping/>
   </p:clrMapOvr>
-  <mc:AlternateContent xmlns:mc="http://schemas.openxmlformats.org/markup-compatibility/2006">
-    <mc:Choice xmlns:p14="http://schemas.microsoft.com/office/powerpoint/2010/main" Requires="p14">
+  <mc:AlternateContent xmlns:mc="http://schemas.openxmlformats.org/markup-compatibility/2006" xmlns:p14="http://schemas.microsoft.com/office/powerpoint/2010/main">
+    <mc:Choice Requires="p14">
       <p:transition spd="slow" p14:dur="1600">
         <p14:gallery dir="l"/>
       </p:transition>
     </mc:Choice>
-    <mc:Fallback>
+    <mc:Fallback xmlns="">
       <p:transition spd="slow">
         <p:fade/>
       </p:transition>
@@ -16618,16 +16561,6 @@
               </a:rPr>
               <a:t>Campo – Fase II</a:t>
             </a:r>
-            <a:endParaRPr lang="pt-PT" sz="1200" dirty="0" smtClean="0">
-              <a:solidFill>
-                <a:schemeClr val="accent6">
-                  <a:lumMod val="60000"/>
-                  <a:lumOff val="40000"/>
-                </a:schemeClr>
-              </a:solidFill>
-              <a:latin typeface="Calibri" panose="020F0502020204030204" pitchFamily="34" charset="0"/>
-              <a:cs typeface="Helvetica" panose="020B0604020202020204" pitchFamily="34" charset="0"/>
-            </a:endParaRPr>
           </a:p>
         </p:txBody>
       </p:sp>
@@ -16744,13 +16677,13 @@
   <p:clrMapOvr>
     <a:masterClrMapping/>
   </p:clrMapOvr>
-  <mc:AlternateContent xmlns:mc="http://schemas.openxmlformats.org/markup-compatibility/2006">
-    <mc:Choice xmlns:p14="http://schemas.microsoft.com/office/powerpoint/2010/main" Requires="p14">
+  <mc:AlternateContent xmlns:mc="http://schemas.openxmlformats.org/markup-compatibility/2006" xmlns:p14="http://schemas.microsoft.com/office/powerpoint/2010/main">
+    <mc:Choice Requires="p14">
       <p:transition spd="slow" p14:dur="1600">
         <p14:gallery dir="l"/>
       </p:transition>
     </mc:Choice>
-    <mc:Fallback>
+    <mc:Fallback xmlns="">
       <p:transition spd="slow">
         <p:fade/>
       </p:transition>
@@ -16866,13 +16799,13 @@
   <p:clrMapOvr>
     <a:masterClrMapping/>
   </p:clrMapOvr>
-  <mc:AlternateContent xmlns:mc="http://schemas.openxmlformats.org/markup-compatibility/2006">
-    <mc:Choice xmlns:p14="http://schemas.microsoft.com/office/powerpoint/2010/main" Requires="p14">
+  <mc:AlternateContent xmlns:mc="http://schemas.openxmlformats.org/markup-compatibility/2006" xmlns:p14="http://schemas.microsoft.com/office/powerpoint/2010/main">
+    <mc:Choice Requires="p14">
       <p:transition spd="slow" p14:dur="1600">
         <p14:gallery dir="l"/>
       </p:transition>
     </mc:Choice>
-    <mc:Fallback>
+    <mc:Fallback xmlns="">
       <p:transition spd="slow">
         <p:fade/>
       </p:transition>
@@ -16934,9 +16867,6 @@
               </a:rPr>
               <a:t>das Entidades e dos Atributos </a:t>
             </a:r>
-            <a:endParaRPr lang="pt-PT" dirty="0">
-              <a:latin typeface="Calibri" panose="020F0502020204030204" pitchFamily="34" charset="0"/>
-            </a:endParaRPr>
           </a:p>
         </p:txBody>
       </p:sp>
@@ -17311,16 +17241,6 @@
               </a:rPr>
               <a:t>Campo – Fase II</a:t>
             </a:r>
-            <a:endParaRPr lang="pt-PT" sz="1200" dirty="0" smtClean="0">
-              <a:solidFill>
-                <a:schemeClr val="accent6">
-                  <a:lumMod val="60000"/>
-                  <a:lumOff val="40000"/>
-                </a:schemeClr>
-              </a:solidFill>
-              <a:latin typeface="Calibri" panose="020F0502020204030204" pitchFamily="34" charset="0"/>
-              <a:cs typeface="Helvetica" panose="020B0604020202020204" pitchFamily="34" charset="0"/>
-            </a:endParaRPr>
           </a:p>
         </p:txBody>
       </p:sp>
@@ -17437,13 +17357,13 @@
   <p:clrMapOvr>
     <a:masterClrMapping/>
   </p:clrMapOvr>
-  <mc:AlternateContent xmlns:mc="http://schemas.openxmlformats.org/markup-compatibility/2006">
-    <mc:Choice xmlns:p14="http://schemas.microsoft.com/office/powerpoint/2010/main" Requires="p14">
+  <mc:AlternateContent xmlns:mc="http://schemas.openxmlformats.org/markup-compatibility/2006" xmlns:p14="http://schemas.microsoft.com/office/powerpoint/2010/main">
+    <mc:Choice Requires="p14">
       <p:transition spd="slow" p14:dur="1600">
         <p14:gallery dir="l"/>
       </p:transition>
     </mc:Choice>
-    <mc:Fallback>
+    <mc:Fallback xmlns="">
       <p:transition spd="slow">
         <p:fade/>
       </p:transition>
@@ -17787,9 +17707,6 @@
               </a:rPr>
               <a:t>das Entidades e dos Atributos </a:t>
             </a:r>
-            <a:endParaRPr lang="pt-PT" dirty="0">
-              <a:latin typeface="Calibri" panose="020F0502020204030204" pitchFamily="34" charset="0"/>
-            </a:endParaRPr>
           </a:p>
         </p:txBody>
       </p:sp>
@@ -17855,16 +17772,6 @@
               </a:rPr>
               <a:t>Campo – Fase II</a:t>
             </a:r>
-            <a:endParaRPr lang="pt-PT" sz="1200" dirty="0" smtClean="0">
-              <a:solidFill>
-                <a:schemeClr val="accent6">
-                  <a:lumMod val="60000"/>
-                  <a:lumOff val="40000"/>
-                </a:schemeClr>
-              </a:solidFill>
-              <a:latin typeface="Calibri" panose="020F0502020204030204" pitchFamily="34" charset="0"/>
-              <a:cs typeface="Helvetica" panose="020B0604020202020204" pitchFamily="34" charset="0"/>
-            </a:endParaRPr>
           </a:p>
         </p:txBody>
       </p:sp>
@@ -17981,13 +17888,13 @@
   <p:clrMapOvr>
     <a:masterClrMapping/>
   </p:clrMapOvr>
-  <mc:AlternateContent xmlns:mc="http://schemas.openxmlformats.org/markup-compatibility/2006">
-    <mc:Choice xmlns:p14="http://schemas.microsoft.com/office/powerpoint/2010/main" Requires="p14">
+  <mc:AlternateContent xmlns:mc="http://schemas.openxmlformats.org/markup-compatibility/2006" xmlns:p14="http://schemas.microsoft.com/office/powerpoint/2010/main">
+    <mc:Choice Requires="p14">
       <p:transition spd="slow" p14:dur="1600">
         <p14:gallery dir="l"/>
       </p:transition>
     </mc:Choice>
-    <mc:Fallback>
+    <mc:Fallback xmlns="">
       <p:transition spd="slow">
         <p:fade/>
       </p:transition>
@@ -18261,7 +18168,6 @@
               <a:rPr lang="pt-PT" sz="1500" dirty="0"/>
               <a:t>. </a:t>
             </a:r>
-            <a:endParaRPr lang="pt-PT" sz="1500" dirty="0"/>
           </a:p>
           <a:p>
             <a:endParaRPr lang="pt-PT" sz="1500" dirty="0"/>
@@ -18353,16 +18259,6 @@
               </a:rPr>
               <a:t>Campo – Fase II</a:t>
             </a:r>
-            <a:endParaRPr lang="pt-PT" sz="1200" dirty="0" smtClean="0">
-              <a:solidFill>
-                <a:schemeClr val="accent6">
-                  <a:lumMod val="60000"/>
-                  <a:lumOff val="40000"/>
-                </a:schemeClr>
-              </a:solidFill>
-              <a:latin typeface="Calibri" panose="020F0502020204030204" pitchFamily="34" charset="0"/>
-              <a:cs typeface="Helvetica" panose="020B0604020202020204" pitchFamily="34" charset="0"/>
-            </a:endParaRPr>
           </a:p>
         </p:txBody>
       </p:sp>
@@ -18503,9 +18399,6 @@
               </a:rPr>
               <a:t>das Entidades e dos Atributos </a:t>
             </a:r>
-            <a:endParaRPr lang="pt-PT" dirty="0">
-              <a:latin typeface="Calibri" panose="020F0502020204030204" pitchFamily="34" charset="0"/>
-            </a:endParaRPr>
           </a:p>
         </p:txBody>
       </p:sp>
@@ -18519,13 +18412,13 @@
   <p:clrMapOvr>
     <a:masterClrMapping/>
   </p:clrMapOvr>
-  <mc:AlternateContent xmlns:mc="http://schemas.openxmlformats.org/markup-compatibility/2006">
-    <mc:Choice xmlns:p14="http://schemas.microsoft.com/office/powerpoint/2010/main" Requires="p14">
+  <mc:AlternateContent xmlns:mc="http://schemas.openxmlformats.org/markup-compatibility/2006" xmlns:p14="http://schemas.microsoft.com/office/powerpoint/2010/main">
+    <mc:Choice Requires="p14">
       <p:transition spd="slow" p14:dur="1600">
         <p14:gallery dir="l"/>
       </p:transition>
     </mc:Choice>
-    <mc:Fallback>
+    <mc:Fallback xmlns="">
       <p:transition spd="slow">
         <p:fade/>
       </p:transition>
@@ -18955,16 +18848,6 @@
               </a:rPr>
               <a:t>Campo – Fase II</a:t>
             </a:r>
-            <a:endParaRPr lang="pt-PT" sz="1200" dirty="0" smtClean="0">
-              <a:solidFill>
-                <a:schemeClr val="accent6">
-                  <a:lumMod val="60000"/>
-                  <a:lumOff val="40000"/>
-                </a:schemeClr>
-              </a:solidFill>
-              <a:latin typeface="Calibri" panose="020F0502020204030204" pitchFamily="34" charset="0"/>
-              <a:cs typeface="Helvetica" panose="020B0604020202020204" pitchFamily="34" charset="0"/>
-            </a:endParaRPr>
           </a:p>
         </p:txBody>
       </p:sp>
@@ -19149,9 +19032,6 @@
               </a:rPr>
               <a:t>dos Relacionamentos </a:t>
             </a:r>
-            <a:endParaRPr lang="pt-PT" dirty="0">
-              <a:latin typeface="Calibri" panose="020F0502020204030204" pitchFamily="34" charset="0"/>
-            </a:endParaRPr>
           </a:p>
         </p:txBody>
       </p:sp>
@@ -19430,16 +19310,6 @@
               </a:rPr>
               <a:t>Campo – Fase II</a:t>
             </a:r>
-            <a:endParaRPr lang="pt-PT" sz="1200" dirty="0" smtClean="0">
-              <a:solidFill>
-                <a:schemeClr val="accent6">
-                  <a:lumMod val="60000"/>
-                  <a:lumOff val="40000"/>
-                </a:schemeClr>
-              </a:solidFill>
-              <a:latin typeface="Calibri" panose="020F0502020204030204" pitchFamily="34" charset="0"/>
-              <a:cs typeface="Helvetica" panose="020B0604020202020204" pitchFamily="34" charset="0"/>
-            </a:endParaRPr>
           </a:p>
         </p:txBody>
       </p:sp>
@@ -19556,13 +19426,13 @@
   <p:clrMapOvr>
     <a:masterClrMapping/>
   </p:clrMapOvr>
-  <mc:AlternateContent xmlns:mc="http://schemas.openxmlformats.org/markup-compatibility/2006">
-    <mc:Choice xmlns:p14="http://schemas.microsoft.com/office/powerpoint/2010/main" Requires="p14">
+  <mc:AlternateContent xmlns:mc="http://schemas.openxmlformats.org/markup-compatibility/2006" xmlns:p14="http://schemas.microsoft.com/office/powerpoint/2010/main">
+    <mc:Choice Requires="p14">
       <p:transition spd="slow" p14:dur="1600">
         <p14:gallery dir="l"/>
       </p:transition>
     </mc:Choice>
-    <mc:Fallback>
+    <mc:Fallback xmlns="">
       <p:transition spd="slow">
         <p:fade/>
       </p:transition>
@@ -19841,16 +19711,6 @@
               </a:rPr>
               <a:t>Campo – Fase II</a:t>
             </a:r>
-            <a:endParaRPr lang="pt-PT" sz="1200" dirty="0" smtClean="0">
-              <a:solidFill>
-                <a:schemeClr val="accent6">
-                  <a:lumMod val="60000"/>
-                  <a:lumOff val="40000"/>
-                </a:schemeClr>
-              </a:solidFill>
-              <a:latin typeface="Calibri" panose="020F0502020204030204" pitchFamily="34" charset="0"/>
-              <a:cs typeface="Helvetica" panose="020B0604020202020204" pitchFamily="34" charset="0"/>
-            </a:endParaRPr>
           </a:p>
         </p:txBody>
       </p:sp>
@@ -19991,9 +19851,6 @@
               </a:rPr>
               <a:t>dos Relacionamentos </a:t>
             </a:r>
-            <a:endParaRPr lang="pt-PT" dirty="0">
-              <a:latin typeface="Calibri" panose="020F0502020204030204" pitchFamily="34" charset="0"/>
-            </a:endParaRPr>
           </a:p>
         </p:txBody>
       </p:sp>
@@ -20007,13 +19864,13 @@
   <p:clrMapOvr>
     <a:masterClrMapping/>
   </p:clrMapOvr>
-  <mc:AlternateContent xmlns:mc="http://schemas.openxmlformats.org/markup-compatibility/2006">
-    <mc:Choice xmlns:p14="http://schemas.microsoft.com/office/powerpoint/2010/main" Requires="p14">
+  <mc:AlternateContent xmlns:mc="http://schemas.openxmlformats.org/markup-compatibility/2006" xmlns:p14="http://schemas.microsoft.com/office/powerpoint/2010/main">
+    <mc:Choice Requires="p14">
       <p:transition spd="slow" p14:dur="1600">
         <p14:gallery dir="l"/>
       </p:transition>
     </mc:Choice>
-    <mc:Fallback>
+    <mc:Fallback xmlns="">
       <p:transition spd="slow">
         <p:fade/>
       </p:transition>
@@ -20242,16 +20099,6 @@
               </a:rPr>
               <a:t>Campo – Fase II</a:t>
             </a:r>
-            <a:endParaRPr lang="pt-PT" sz="1200" dirty="0" smtClean="0">
-              <a:solidFill>
-                <a:schemeClr val="accent6">
-                  <a:lumMod val="60000"/>
-                  <a:lumOff val="40000"/>
-                </a:schemeClr>
-              </a:solidFill>
-              <a:latin typeface="Calibri" panose="020F0502020204030204" pitchFamily="34" charset="0"/>
-              <a:cs typeface="Helvetica" panose="020B0604020202020204" pitchFamily="34" charset="0"/>
-            </a:endParaRPr>
           </a:p>
         </p:txBody>
       </p:sp>
@@ -20392,9 +20239,6 @@
               </a:rPr>
               <a:t>dos Relacionamentos </a:t>
             </a:r>
-            <a:endParaRPr lang="pt-PT" dirty="0">
-              <a:latin typeface="Calibri" panose="020F0502020204030204" pitchFamily="34" charset="0"/>
-            </a:endParaRPr>
           </a:p>
         </p:txBody>
       </p:sp>
@@ -20408,13 +20252,13 @@
   <p:clrMapOvr>
     <a:masterClrMapping/>
   </p:clrMapOvr>
-  <mc:AlternateContent xmlns:mc="http://schemas.openxmlformats.org/markup-compatibility/2006">
-    <mc:Choice xmlns:p14="http://schemas.microsoft.com/office/powerpoint/2010/main" Requires="p14">
+  <mc:AlternateContent xmlns:mc="http://schemas.openxmlformats.org/markup-compatibility/2006" xmlns:p14="http://schemas.microsoft.com/office/powerpoint/2010/main">
+    <mc:Choice Requires="p14">
       <p:transition spd="slow" p14:dur="1600">
         <p14:gallery dir="l"/>
       </p:transition>
     </mc:Choice>
-    <mc:Fallback>
+    <mc:Fallback xmlns="">
       <p:transition spd="slow">
         <p:fade/>
       </p:transition>
@@ -20476,9 +20320,6 @@
               </a:rPr>
               <a:t>das Chaves Primárias </a:t>
             </a:r>
-            <a:endParaRPr lang="pt-PT" dirty="0">
-              <a:latin typeface="Calibri" panose="020F0502020204030204" pitchFamily="34" charset="0"/>
-            </a:endParaRPr>
           </a:p>
         </p:txBody>
       </p:sp>
@@ -21392,16 +21233,6 @@
               </a:rPr>
               <a:t>Campo – Fase II</a:t>
             </a:r>
-            <a:endParaRPr lang="pt-PT" sz="1200" dirty="0" smtClean="0">
-              <a:solidFill>
-                <a:schemeClr val="accent6">
-                  <a:lumMod val="60000"/>
-                  <a:lumOff val="40000"/>
-                </a:schemeClr>
-              </a:solidFill>
-              <a:latin typeface="Calibri" panose="020F0502020204030204" pitchFamily="34" charset="0"/>
-              <a:cs typeface="Helvetica" panose="020B0604020202020204" pitchFamily="34" charset="0"/>
-            </a:endParaRPr>
           </a:p>
         </p:txBody>
       </p:sp>
@@ -21518,13 +21349,13 @@
   <p:clrMapOvr>
     <a:masterClrMapping/>
   </p:clrMapOvr>
-  <mc:AlternateContent xmlns:mc="http://schemas.openxmlformats.org/markup-compatibility/2006">
-    <mc:Choice xmlns:p14="http://schemas.microsoft.com/office/powerpoint/2010/main" Requires="p14">
+  <mc:AlternateContent xmlns:mc="http://schemas.openxmlformats.org/markup-compatibility/2006" xmlns:p14="http://schemas.microsoft.com/office/powerpoint/2010/main">
+    <mc:Choice Requires="p14">
       <p:transition spd="slow" p14:dur="1600">
         <p14:gallery dir="l"/>
       </p:transition>
     </mc:Choice>
-    <mc:Fallback>
+    <mc:Fallback xmlns="">
       <p:transition spd="slow">
         <p:fade/>
       </p:transition>
@@ -21578,9 +21409,6 @@
               </a:rPr>
               <a:t>Modelo Lógico </a:t>
             </a:r>
-            <a:endParaRPr lang="pt-PT" dirty="0">
-              <a:latin typeface="Calibri" panose="020F0502020204030204" pitchFamily="34" charset="0"/>
-            </a:endParaRPr>
           </a:p>
         </p:txBody>
       </p:sp>
@@ -21738,16 +21566,6 @@
               </a:rPr>
               <a:t>Campo – Fase II</a:t>
             </a:r>
-            <a:endParaRPr lang="pt-PT" sz="1200" dirty="0" smtClean="0">
-              <a:solidFill>
-                <a:schemeClr val="accent6">
-                  <a:lumMod val="60000"/>
-                  <a:lumOff val="40000"/>
-                </a:schemeClr>
-              </a:solidFill>
-              <a:latin typeface="Calibri" panose="020F0502020204030204" pitchFamily="34" charset="0"/>
-              <a:cs typeface="Helvetica" panose="020B0604020202020204" pitchFamily="34" charset="0"/>
-            </a:endParaRPr>
           </a:p>
         </p:txBody>
       </p:sp>
@@ -21864,13 +21682,13 @@
   <p:clrMapOvr>
     <a:masterClrMapping/>
   </p:clrMapOvr>
-  <mc:AlternateContent xmlns:mc="http://schemas.openxmlformats.org/markup-compatibility/2006">
-    <mc:Choice xmlns:p14="http://schemas.microsoft.com/office/powerpoint/2010/main" Requires="p14">
+  <mc:AlternateContent xmlns:mc="http://schemas.openxmlformats.org/markup-compatibility/2006" xmlns:p14="http://schemas.microsoft.com/office/powerpoint/2010/main">
+    <mc:Choice Requires="p14">
       <p:transition spd="slow" p14:dur="1600">
         <p14:gallery dir="l"/>
       </p:transition>
     </mc:Choice>
-    <mc:Fallback>
+    <mc:Fallback xmlns="">
       <p:transition spd="slow">
         <p:fade/>
       </p:transition>
@@ -21985,13 +21803,13 @@
   <p:clrMapOvr>
     <a:masterClrMapping/>
   </p:clrMapOvr>
-  <mc:AlternateContent xmlns:mc="http://schemas.openxmlformats.org/markup-compatibility/2006">
-    <mc:Choice xmlns:p14="http://schemas.microsoft.com/office/powerpoint/2010/main" Requires="p14">
+  <mc:AlternateContent xmlns:mc="http://schemas.openxmlformats.org/markup-compatibility/2006" xmlns:p14="http://schemas.microsoft.com/office/powerpoint/2010/main">
+    <mc:Choice Requires="p14">
       <p:transition spd="slow" p14:dur="1600">
         <p14:gallery dir="l"/>
       </p:transition>
     </mc:Choice>
-    <mc:Fallback>
+    <mc:Fallback xmlns="">
       <p:transition spd="slow">
         <p:fade/>
       </p:transition>
@@ -22154,16 +21972,6 @@
               </a:rPr>
               <a:t>Campo – Fase II</a:t>
             </a:r>
-            <a:endParaRPr lang="pt-PT" sz="1200" dirty="0" smtClean="0">
-              <a:solidFill>
-                <a:schemeClr val="accent6">
-                  <a:lumMod val="60000"/>
-                  <a:lumOff val="40000"/>
-                </a:schemeClr>
-              </a:solidFill>
-              <a:latin typeface="Calibri" panose="020F0502020204030204" pitchFamily="34" charset="0"/>
-              <a:cs typeface="Helvetica" panose="020B0604020202020204" pitchFamily="34" charset="0"/>
-            </a:endParaRPr>
           </a:p>
         </p:txBody>
       </p:sp>
@@ -22321,13 +22129,13 @@
   <p:clrMapOvr>
     <a:masterClrMapping/>
   </p:clrMapOvr>
-  <mc:AlternateContent xmlns:mc="http://schemas.openxmlformats.org/markup-compatibility/2006">
-    <mc:Choice xmlns:p14="http://schemas.microsoft.com/office/powerpoint/2010/main" Requires="p14">
+  <mc:AlternateContent xmlns:mc="http://schemas.openxmlformats.org/markup-compatibility/2006" xmlns:p14="http://schemas.microsoft.com/office/powerpoint/2010/main">
+    <mc:Choice Requires="p14">
       <p:transition spd="slow" p14:dur="1600">
         <p14:gallery dir="l"/>
       </p:transition>
     </mc:Choice>
-    <mc:Fallback>
+    <mc:Fallback xmlns="">
       <p:transition spd="slow">
         <p:fade/>
       </p:transition>
@@ -22548,16 +22356,6 @@
               </a:rPr>
               <a:t>Campo – Fase II</a:t>
             </a:r>
-            <a:endParaRPr lang="pt-PT" sz="1200" dirty="0" smtClean="0">
-              <a:solidFill>
-                <a:schemeClr val="accent6">
-                  <a:lumMod val="60000"/>
-                  <a:lumOff val="40000"/>
-                </a:schemeClr>
-              </a:solidFill>
-              <a:latin typeface="Calibri" panose="020F0502020204030204" pitchFamily="34" charset="0"/>
-              <a:cs typeface="Helvetica" panose="020B0604020202020204" pitchFamily="34" charset="0"/>
-            </a:endParaRPr>
           </a:p>
         </p:txBody>
       </p:sp>
@@ -22776,13 +22574,13 @@
   <p:clrMapOvr>
     <a:masterClrMapping/>
   </p:clrMapOvr>
-  <mc:AlternateContent xmlns:mc="http://schemas.openxmlformats.org/markup-compatibility/2006">
-    <mc:Choice xmlns:p14="http://schemas.microsoft.com/office/powerpoint/2010/main" Requires="p14">
+  <mc:AlternateContent xmlns:mc="http://schemas.openxmlformats.org/markup-compatibility/2006" xmlns:p14="http://schemas.microsoft.com/office/powerpoint/2010/main">
+    <mc:Choice Requires="p14">
       <p:transition spd="slow" p14:dur="1600">
         <p14:gallery dir="l"/>
       </p:transition>
     </mc:Choice>
-    <mc:Fallback>
+    <mc:Fallback xmlns="">
       <p:transition spd="slow">
         <p:fade/>
       </p:transition>
@@ -22848,9 +22646,6 @@
               </a:rPr>
               <a:t>de Sequência </a:t>
             </a:r>
-            <a:endParaRPr lang="pt-PT" dirty="0">
-              <a:latin typeface="Calibri" panose="020F0502020204030204" pitchFamily="34" charset="0"/>
-            </a:endParaRPr>
           </a:p>
         </p:txBody>
       </p:sp>
@@ -22939,16 +22734,6 @@
               </a:rPr>
               <a:t>Campo – Fase II</a:t>
             </a:r>
-            <a:endParaRPr lang="pt-PT" sz="1200" dirty="0" smtClean="0">
-              <a:solidFill>
-                <a:schemeClr val="accent6">
-                  <a:lumMod val="60000"/>
-                  <a:lumOff val="40000"/>
-                </a:schemeClr>
-              </a:solidFill>
-              <a:latin typeface="Calibri" panose="020F0502020204030204" pitchFamily="34" charset="0"/>
-              <a:cs typeface="Helvetica" panose="020B0604020202020204" pitchFamily="34" charset="0"/>
-            </a:endParaRPr>
           </a:p>
         </p:txBody>
       </p:sp>
@@ -23106,13 +22891,13 @@
   <p:clrMapOvr>
     <a:masterClrMapping/>
   </p:clrMapOvr>
-  <mc:AlternateContent xmlns:mc="http://schemas.openxmlformats.org/markup-compatibility/2006">
-    <mc:Choice xmlns:p14="http://schemas.microsoft.com/office/powerpoint/2010/main" Requires="p14">
+  <mc:AlternateContent xmlns:mc="http://schemas.openxmlformats.org/markup-compatibility/2006" xmlns:p14="http://schemas.microsoft.com/office/powerpoint/2010/main">
+    <mc:Choice Requires="p14">
       <p:transition spd="slow" p14:dur="1600">
         <p14:gallery dir="l"/>
       </p:transition>
     </mc:Choice>
-    <mc:Fallback>
+    <mc:Fallback xmlns="">
       <p:transition spd="slow">
         <p:fade/>
       </p:transition>
@@ -23230,16 +23015,6 @@
               </a:rPr>
               <a:t>Campo – Fase II</a:t>
             </a:r>
-            <a:endParaRPr lang="pt-PT" sz="1200" dirty="0" smtClean="0">
-              <a:solidFill>
-                <a:schemeClr val="accent6">
-                  <a:lumMod val="60000"/>
-                  <a:lumOff val="40000"/>
-                </a:schemeClr>
-              </a:solidFill>
-              <a:latin typeface="Calibri" panose="020F0502020204030204" pitchFamily="34" charset="0"/>
-              <a:cs typeface="Helvetica" panose="020B0604020202020204" pitchFamily="34" charset="0"/>
-            </a:endParaRPr>
           </a:p>
         </p:txBody>
       </p:sp>
@@ -23406,13 +23181,13 @@
   <p:clrMapOvr>
     <a:masterClrMapping/>
   </p:clrMapOvr>
-  <mc:AlternateContent xmlns:mc="http://schemas.openxmlformats.org/markup-compatibility/2006">
-    <mc:Choice xmlns:p14="http://schemas.microsoft.com/office/powerpoint/2010/main" Requires="p14">
+  <mc:AlternateContent xmlns:mc="http://schemas.openxmlformats.org/markup-compatibility/2006" xmlns:p14="http://schemas.microsoft.com/office/powerpoint/2010/main">
+    <mc:Choice Requires="p14">
       <p:transition spd="slow" p14:dur="1600">
         <p14:gallery dir="l"/>
       </p:transition>
     </mc:Choice>
-    <mc:Fallback>
+    <mc:Fallback xmlns="">
       <p:transition spd="slow">
         <p:fade/>
       </p:transition>
@@ -23472,9 +23247,6 @@
               </a:rPr>
               <a:t>e Funcionalidades </a:t>
             </a:r>
-            <a:endParaRPr lang="pt-PT" dirty="0">
-              <a:latin typeface="Calibri" panose="020F0502020204030204" pitchFamily="34" charset="0"/>
-            </a:endParaRPr>
           </a:p>
         </p:txBody>
       </p:sp>
@@ -23766,7 +23538,6 @@
               <a:rPr lang="pt-PT" sz="1600" dirty="0"/>
               <a:t>na aplicação, para poderem tirar partido desta. </a:t>
             </a:r>
-            <a:endParaRPr lang="pt-PT" sz="1600" dirty="0"/>
           </a:p>
         </p:txBody>
       </p:sp>
@@ -23855,16 +23626,6 @@
               </a:rPr>
               <a:t>Campo – Fase II</a:t>
             </a:r>
-            <a:endParaRPr lang="pt-PT" sz="1200" dirty="0" smtClean="0">
-              <a:solidFill>
-                <a:schemeClr val="accent6">
-                  <a:lumMod val="60000"/>
-                  <a:lumOff val="40000"/>
-                </a:schemeClr>
-              </a:solidFill>
-              <a:latin typeface="Calibri" panose="020F0502020204030204" pitchFamily="34" charset="0"/>
-              <a:cs typeface="Helvetica" panose="020B0604020202020204" pitchFamily="34" charset="0"/>
-            </a:endParaRPr>
           </a:p>
         </p:txBody>
       </p:sp>
@@ -24102,13 +23863,13 @@
   <p:clrMapOvr>
     <a:masterClrMapping/>
   </p:clrMapOvr>
-  <mc:AlternateContent xmlns:mc="http://schemas.openxmlformats.org/markup-compatibility/2006">
-    <mc:Choice xmlns:p14="http://schemas.microsoft.com/office/powerpoint/2010/main" Requires="p14">
+  <mc:AlternateContent xmlns:mc="http://schemas.openxmlformats.org/markup-compatibility/2006" xmlns:p14="http://schemas.microsoft.com/office/powerpoint/2010/main">
+    <mc:Choice Requires="p14">
       <p:transition spd="slow" p14:dur="1600">
         <p14:gallery dir="l"/>
       </p:transition>
     </mc:Choice>
-    <mc:Fallback>
+    <mc:Fallback xmlns="">
       <p:transition spd="slow">
         <p:fade/>
       </p:transition>
@@ -24253,16 +24014,6 @@
               </a:rPr>
               <a:t>Campo – Fase II</a:t>
             </a:r>
-            <a:endParaRPr lang="pt-PT" sz="1200" dirty="0" smtClean="0">
-              <a:solidFill>
-                <a:schemeClr val="accent6">
-                  <a:lumMod val="60000"/>
-                  <a:lumOff val="40000"/>
-                </a:schemeClr>
-              </a:solidFill>
-              <a:latin typeface="Calibri" panose="020F0502020204030204" pitchFamily="34" charset="0"/>
-              <a:cs typeface="Helvetica" panose="020B0604020202020204" pitchFamily="34" charset="0"/>
-            </a:endParaRPr>
           </a:p>
         </p:txBody>
       </p:sp>
@@ -24379,13 +24130,13 @@
   <p:clrMapOvr>
     <a:masterClrMapping/>
   </p:clrMapOvr>
-  <mc:AlternateContent xmlns:mc="http://schemas.openxmlformats.org/markup-compatibility/2006">
-    <mc:Choice xmlns:p14="http://schemas.microsoft.com/office/powerpoint/2010/main" Requires="p14">
+  <mc:AlternateContent xmlns:mc="http://schemas.openxmlformats.org/markup-compatibility/2006" xmlns:p14="http://schemas.microsoft.com/office/powerpoint/2010/main">
+    <mc:Choice Requires="p14">
       <p:transition spd="slow" p14:dur="1600">
         <p14:gallery dir="l"/>
       </p:transition>
     </mc:Choice>
-    <mc:Fallback>
+    <mc:Fallback xmlns="">
       <p:transition spd="slow">
         <p:fade/>
       </p:transition>
@@ -24451,7 +24202,7 @@
       </p:sp>
       <p:pic>
         <p:nvPicPr>
-          <p:cNvPr id="21506" name="Picture 2"/>
+          <p:cNvPr id="1026" name="Picture 2"/>
           <p:cNvPicPr>
             <a:picLocks noChangeAspect="1" noChangeArrowheads="1"/>
           </p:cNvPicPr>
@@ -24472,8 +24223,8 @@
         </p:blipFill>
         <p:spPr bwMode="auto">
           <a:xfrm>
-            <a:off x="79765" y="31779"/>
-            <a:ext cx="9064235" cy="6678910"/>
+            <a:off x="0" y="0"/>
+            <a:ext cx="9149440" cy="6741368"/>
           </a:xfrm>
           <a:prstGeom prst="rect">
             <a:avLst/>
@@ -24513,13 +24264,13 @@
   <p:clrMapOvr>
     <a:masterClrMapping/>
   </p:clrMapOvr>
-  <mc:AlternateContent xmlns:mc="http://schemas.openxmlformats.org/markup-compatibility/2006">
-    <mc:Choice xmlns:p14="http://schemas.microsoft.com/office/powerpoint/2010/main" Requires="p14">
+  <mc:AlternateContent xmlns:mc="http://schemas.openxmlformats.org/markup-compatibility/2006" xmlns:p14="http://schemas.microsoft.com/office/powerpoint/2010/main">
+    <mc:Choice Requires="p14">
       <p:transition spd="slow" p14:dur="1600">
         <p14:gallery dir="l"/>
       </p:transition>
     </mc:Choice>
-    <mc:Fallback>
+    <mc:Fallback xmlns="">
       <p:transition spd="slow">
         <p:fade/>
       </p:transition>
@@ -24843,16 +24594,6 @@
               </a:rPr>
               <a:t>Campo – Fase II</a:t>
             </a:r>
-            <a:endParaRPr lang="pt-PT" sz="1200" dirty="0" smtClean="0">
-              <a:solidFill>
-                <a:schemeClr val="accent6">
-                  <a:lumMod val="60000"/>
-                  <a:lumOff val="40000"/>
-                </a:schemeClr>
-              </a:solidFill>
-              <a:latin typeface="Calibri" panose="020F0502020204030204" pitchFamily="34" charset="0"/>
-              <a:cs typeface="Helvetica" panose="020B0604020202020204" pitchFamily="34" charset="0"/>
-            </a:endParaRPr>
           </a:p>
         </p:txBody>
       </p:sp>
@@ -25264,16 +25005,6 @@
               </a:rPr>
               <a:t>Campo – Fase II</a:t>
             </a:r>
-            <a:endParaRPr lang="pt-PT" sz="1200" dirty="0" smtClean="0">
-              <a:solidFill>
-                <a:schemeClr val="accent6">
-                  <a:lumMod val="60000"/>
-                  <a:lumOff val="40000"/>
-                </a:schemeClr>
-              </a:solidFill>
-              <a:latin typeface="Calibri" panose="020F0502020204030204" pitchFamily="34" charset="0"/>
-              <a:cs typeface="Helvetica" panose="020B0604020202020204" pitchFamily="34" charset="0"/>
-            </a:endParaRPr>
           </a:p>
         </p:txBody>
       </p:sp>
@@ -26390,16 +26121,6 @@
               </a:rPr>
               <a:t>Campo – Fase II</a:t>
             </a:r>
-            <a:endParaRPr lang="pt-PT" sz="1200" dirty="0" smtClean="0">
-              <a:solidFill>
-                <a:schemeClr val="accent6">
-                  <a:lumMod val="60000"/>
-                  <a:lumOff val="40000"/>
-                </a:schemeClr>
-              </a:solidFill>
-              <a:latin typeface="Calibri" panose="020F0502020204030204" pitchFamily="34" charset="0"/>
-              <a:cs typeface="Helvetica" panose="020B0604020202020204" pitchFamily="34" charset="0"/>
-            </a:endParaRPr>
           </a:p>
         </p:txBody>
       </p:sp>
@@ -26898,16 +26619,6 @@
               </a:rPr>
               <a:t>Campo – Fase II</a:t>
             </a:r>
-            <a:endParaRPr lang="pt-PT" sz="1200" dirty="0" smtClean="0">
-              <a:solidFill>
-                <a:schemeClr val="accent6">
-                  <a:lumMod val="60000"/>
-                  <a:lumOff val="40000"/>
-                </a:schemeClr>
-              </a:solidFill>
-              <a:latin typeface="Calibri" panose="020F0502020204030204" pitchFamily="34" charset="0"/>
-              <a:cs typeface="Helvetica" panose="020B0604020202020204" pitchFamily="34" charset="0"/>
-            </a:endParaRPr>
           </a:p>
         </p:txBody>
       </p:sp>
@@ -27451,16 +27162,6 @@
               </a:rPr>
               <a:t>Campo – Fase II</a:t>
             </a:r>
-            <a:endParaRPr lang="pt-PT" sz="1200" dirty="0" smtClean="0">
-              <a:solidFill>
-                <a:schemeClr val="accent6">
-                  <a:lumMod val="60000"/>
-                  <a:lumOff val="40000"/>
-                </a:schemeClr>
-              </a:solidFill>
-              <a:latin typeface="Calibri" panose="020F0502020204030204" pitchFamily="34" charset="0"/>
-              <a:cs typeface="Helvetica" panose="020B0604020202020204" pitchFamily="34" charset="0"/>
-            </a:endParaRPr>
           </a:p>
         </p:txBody>
       </p:sp>
@@ -28067,16 +27768,6 @@
               </a:rPr>
               <a:t>Campo – Fase II</a:t>
             </a:r>
-            <a:endParaRPr lang="pt-PT" sz="1200" dirty="0" smtClean="0">
-              <a:solidFill>
-                <a:schemeClr val="accent6">
-                  <a:lumMod val="60000"/>
-                  <a:lumOff val="40000"/>
-                </a:schemeClr>
-              </a:solidFill>
-              <a:latin typeface="Calibri" panose="020F0502020204030204" pitchFamily="34" charset="0"/>
-              <a:cs typeface="Helvetica" panose="020B0604020202020204" pitchFamily="34" charset="0"/>
-            </a:endParaRPr>
           </a:p>
         </p:txBody>
       </p:sp>
@@ -28321,16 +28012,6 @@
               </a:rPr>
               <a:t>Campo – Fase II</a:t>
             </a:r>
-            <a:endParaRPr lang="pt-PT" sz="1200" dirty="0" smtClean="0">
-              <a:solidFill>
-                <a:schemeClr val="accent6">
-                  <a:lumMod val="60000"/>
-                  <a:lumOff val="40000"/>
-                </a:schemeClr>
-              </a:solidFill>
-              <a:latin typeface="Calibri" panose="020F0502020204030204" pitchFamily="34" charset="0"/>
-              <a:cs typeface="Helvetica" panose="020B0604020202020204" pitchFamily="34" charset="0"/>
-            </a:endParaRPr>
           </a:p>
         </p:txBody>
       </p:sp>
@@ -29206,16 +28887,6 @@
               </a:rPr>
               <a:t>Campo – Fase II</a:t>
             </a:r>
-            <a:endParaRPr lang="pt-PT" sz="1200" dirty="0" smtClean="0">
-              <a:solidFill>
-                <a:schemeClr val="accent6">
-                  <a:lumMod val="60000"/>
-                  <a:lumOff val="40000"/>
-                </a:schemeClr>
-              </a:solidFill>
-              <a:latin typeface="Calibri" panose="020F0502020204030204" pitchFamily="34" charset="0"/>
-              <a:cs typeface="Helvetica" panose="020B0604020202020204" pitchFamily="34" charset="0"/>
-            </a:endParaRPr>
           </a:p>
         </p:txBody>
       </p:sp>
@@ -29332,13 +29003,13 @@
   <p:clrMapOvr>
     <a:masterClrMapping/>
   </p:clrMapOvr>
-  <mc:AlternateContent xmlns:mc="http://schemas.openxmlformats.org/markup-compatibility/2006">
-    <mc:Choice xmlns:p14="http://schemas.microsoft.com/office/powerpoint/2010/main" Requires="p14">
+  <mc:AlternateContent xmlns:mc="http://schemas.openxmlformats.org/markup-compatibility/2006" xmlns:p14="http://schemas.microsoft.com/office/powerpoint/2010/main">
+    <mc:Choice Requires="p14">
       <p:transition spd="slow" p14:dur="1600">
         <p14:gallery dir="l"/>
       </p:transition>
     </mc:Choice>
-    <mc:Fallback>
+    <mc:Fallback xmlns="">
       <p:transition spd="slow">
         <p:fade/>
       </p:transition>
@@ -29599,7 +29270,7 @@
   <a:extraClrSchemeLst/>
   <a:extLst>
     <a:ext uri="{05A4C25C-085E-4340-85A3-A5531E510DB2}">
-      <thm15:themeFamily xmlns="" xmlns:thm15="http://schemas.microsoft.com/office/thememl/2012/main" name="Circuit" id="{0AC2F7E7-15F5-431C-B2A2-456FE929F56C}" vid="{142578CA-DEC9-49C3-80AF-C113973CC9A9}"/>
+      <thm15:themeFamily xmlns:thm15="http://schemas.microsoft.com/office/thememl/2012/main" xmlns="" name="Circuit" id="{0AC2F7E7-15F5-431C-B2A2-456FE929F56C}" vid="{142578CA-DEC9-49C3-80AF-C113973CC9A9}"/>
     </a:ext>
   </a:extLst>
 </a:theme>

</xml_diff>